<commit_message>
Presentation 6 tdd updated
</commit_message>
<xml_diff>
--- a/Presentations/6- Clean Code - TDD.pptx
+++ b/Presentations/6- Clean Code - TDD.pptx
@@ -5,10 +5,10 @@
     <p:sldMasterId id="2147483648" r:id="rId4"/>
   </p:sldMasterIdLst>
   <p:notesMasterIdLst>
-    <p:notesMasterId r:id="rId13"/>
+    <p:notesMasterId r:id="rId16"/>
   </p:notesMasterIdLst>
   <p:handoutMasterIdLst>
-    <p:handoutMasterId r:id="rId14"/>
+    <p:handoutMasterId r:id="rId17"/>
   </p:handoutMasterIdLst>
   <p:sldIdLst>
     <p:sldId id="449" r:id="rId5"/>
@@ -17,13 +17,16 @@
     <p:sldId id="450" r:id="rId8"/>
     <p:sldId id="453" r:id="rId9"/>
     <p:sldId id="454" r:id="rId10"/>
-    <p:sldId id="455" r:id="rId11"/>
-    <p:sldId id="422" r:id="rId12"/>
+    <p:sldId id="456" r:id="rId11"/>
+    <p:sldId id="457" r:id="rId12"/>
+    <p:sldId id="458" r:id="rId13"/>
+    <p:sldId id="455" r:id="rId14"/>
+    <p:sldId id="422" r:id="rId15"/>
   </p:sldIdLst>
   <p:sldSz cx="12192000" cy="6858000"/>
   <p:notesSz cx="6858000" cy="9144000"/>
   <p:custDataLst>
-    <p:tags r:id="rId15"/>
+    <p:tags r:id="rId18"/>
   </p:custDataLst>
   <p:defaultTextStyle>
     <a:defPPr>
@@ -239,7 +242,7 @@
           <a:p>
             <a:fld id="{D54D4046-5866-459D-BEB5-A0B0377E3E3F}" type="datetime1">
               <a:rPr lang="en-US" sz="1000" smtClean="0"/>
-              <a:t>10/2/22</a:t>
+              <a:t>10/5/22</a:t>
             </a:fld>
             <a:endParaRPr lang="en-US" sz="1000"/>
           </a:p>
@@ -1720,7 +1723,7 @@
           <a:p>
             <a:fld id="{86CA08A8-CD0A-4CED-A7DF-8FE5DAE0B145}" type="datetime1">
               <a:rPr lang="en-US" smtClean="0"/>
-              <a:t>10/2/22</a:t>
+              <a:t>10/5/22</a:t>
             </a:fld>
             <a:endParaRPr lang="en-US" dirty="0"/>
           </a:p>
@@ -2086,7 +2089,7 @@
           <a:p>
             <a:fld id="{3CB1730B-F0FD-4857-ADC5-05FFCBB96A2D}" type="datetime1">
               <a:rPr lang="en-US" smtClean="0"/>
-              <a:t>10/2/22</a:t>
+              <a:t>10/5/22</a:t>
             </a:fld>
             <a:endParaRPr lang="en-US" dirty="0"/>
           </a:p>
@@ -2223,7 +2226,7 @@
           <a:p>
             <a:fld id="{AD73FA9E-13CA-4D34-8989-6ECB15E9C63C}" type="datetime1">
               <a:rPr lang="en-US" smtClean="0"/>
-              <a:t>10/2/22</a:t>
+              <a:t>10/5/22</a:t>
             </a:fld>
             <a:endParaRPr lang="en-US" dirty="0"/>
           </a:p>
@@ -2253,7 +2256,7 @@
             <a:fld id="{78ADB214-F42C-4297-A187-8792AE2D2F13}" type="slidenum">
               <a:rPr lang="en-US" smtClean="0"/>
               <a:pPr/>
-              <a:t>8</a:t>
+              <a:t>11</a:t>
             </a:fld>
             <a:endParaRPr lang="en-US" dirty="0"/>
           </a:p>
@@ -10671,6 +10674,138 @@
 </p:sld>
 </file>
 
+<file path=ppt/slides/slide10.xml><?xml version="1.0" encoding="utf-8"?>
+<p:sld xmlns:a="http://schemas.openxmlformats.org/drawingml/2006/main" xmlns:r="http://schemas.openxmlformats.org/officeDocument/2006/relationships" xmlns:p="http://schemas.openxmlformats.org/presentationml/2006/main">
+  <p:cSld>
+    <p:spTree>
+      <p:nvGrpSpPr>
+        <p:cNvPr id="1" name=""/>
+        <p:cNvGrpSpPr/>
+        <p:nvPr/>
+      </p:nvGrpSpPr>
+      <p:grpSpPr>
+        <a:xfrm>
+          <a:off x="0" y="0"/>
+          <a:ext cx="0" cy="0"/>
+          <a:chOff x="0" y="0"/>
+          <a:chExt cx="0" cy="0"/>
+        </a:xfrm>
+      </p:grpSpPr>
+      <p:sp>
+        <p:nvSpPr>
+          <p:cNvPr id="7" name="TextBox 6">
+            <a:extLst>
+              <a:ext uri="{FF2B5EF4-FFF2-40B4-BE49-F238E27FC236}">
+                <a16:creationId xmlns:a16="http://schemas.microsoft.com/office/drawing/2014/main" id="{956C5635-7136-B561-0AB2-E3C1746B4DE6}"/>
+              </a:ext>
+            </a:extLst>
+          </p:cNvPr>
+          <p:cNvSpPr txBox="1"/>
+          <p:nvPr/>
+        </p:nvSpPr>
+        <p:spPr>
+          <a:xfrm>
+            <a:off x="3359696" y="2852936"/>
+            <a:ext cx="4139275" cy="369332"/>
+          </a:xfrm>
+          <a:prstGeom prst="rect">
+            <a:avLst/>
+          </a:prstGeom>
+          <a:noFill/>
+        </p:spPr>
+        <p:txBody>
+          <a:bodyPr wrap="none" rtlCol="0">
+            <a:spAutoFit/>
+          </a:bodyPr>
+          <a:lstStyle/>
+          <a:p>
+            <a:pPr algn="l">
+              <a:lnSpc>
+                <a:spcPct val="90000"/>
+              </a:lnSpc>
+              <a:spcBef>
+                <a:spcPts val="1200"/>
+              </a:spcBef>
+            </a:pPr>
+            <a:r>
+              <a:rPr lang="en-US" sz="2000" dirty="0">
+                <a:solidFill>
+                  <a:schemeClr val="tx2"/>
+                </a:solidFill>
+              </a:rPr>
+              <a:t>Over to the </a:t>
+            </a:r>
+            <a:r>
+              <a:rPr lang="en-US" sz="2000" dirty="0" err="1">
+                <a:solidFill>
+                  <a:schemeClr val="tx2"/>
+                </a:solidFill>
+              </a:rPr>
+              <a:t>petstore</a:t>
+            </a:r>
+            <a:r>
+              <a:rPr lang="en-US" sz="2000" dirty="0">
+                <a:solidFill>
+                  <a:schemeClr val="tx2"/>
+                </a:solidFill>
+              </a:rPr>
+              <a:t> api… tdd style</a:t>
+            </a:r>
+          </a:p>
+        </p:txBody>
+      </p:sp>
+    </p:spTree>
+    <p:extLst>
+      <p:ext uri="{BB962C8B-B14F-4D97-AF65-F5344CB8AC3E}">
+        <p14:creationId xmlns:p14="http://schemas.microsoft.com/office/powerpoint/2010/main" val="1874779188"/>
+      </p:ext>
+    </p:extLst>
+  </p:cSld>
+  <p:clrMapOvr>
+    <a:masterClrMapping/>
+  </p:clrMapOvr>
+  <p:transition>
+    <p:fade/>
+  </p:transition>
+</p:sld>
+</file>
+
+<file path=ppt/slides/slide11.xml><?xml version="1.0" encoding="utf-8"?>
+<p:sld xmlns:a="http://schemas.openxmlformats.org/drawingml/2006/main" xmlns:r="http://schemas.openxmlformats.org/officeDocument/2006/relationships" xmlns:p="http://schemas.openxmlformats.org/presentationml/2006/main">
+  <p:cSld>
+    <p:spTree>
+      <p:nvGrpSpPr>
+        <p:cNvPr id="1" name=""/>
+        <p:cNvGrpSpPr/>
+        <p:nvPr/>
+      </p:nvGrpSpPr>
+      <p:grpSpPr>
+        <a:xfrm>
+          <a:off x="0" y="0"/>
+          <a:ext cx="0" cy="0"/>
+          <a:chOff x="0" y="0"/>
+          <a:chExt cx="0" cy="0"/>
+        </a:xfrm>
+      </p:grpSpPr>
+    </p:spTree>
+    <p:custDataLst>
+      <p:tags r:id="rId1"/>
+    </p:custDataLst>
+    <p:extLst>
+      <p:ext uri="{BB962C8B-B14F-4D97-AF65-F5344CB8AC3E}">
+        <p14:creationId xmlns:p14="http://schemas.microsoft.com/office/powerpoint/2010/main" val="1524910866"/>
+      </p:ext>
+    </p:extLst>
+  </p:cSld>
+  <p:clrMapOvr>
+    <a:masterClrMapping/>
+  </p:clrMapOvr>
+  <p:transition>
+    <p:fade/>
+  </p:transition>
+</p:sld>
+</file>
+
 <file path=ppt/slides/slide2.xml><?xml version="1.0" encoding="utf-8"?>
 <p:sld xmlns:a="http://schemas.openxmlformats.org/drawingml/2006/main" xmlns:r="http://schemas.openxmlformats.org/officeDocument/2006/relationships" xmlns:p="http://schemas.openxmlformats.org/presentationml/2006/main">
   <p:cSld>
@@ -11213,8 +11348,8 @@
           </a:p>
         </p:txBody>
       </p:sp>
-      <mc:AlternateContent xmlns:mc="http://schemas.openxmlformats.org/markup-compatibility/2006">
-        <mc:Choice xmlns:p14="http://schemas.microsoft.com/office/powerpoint/2010/main" Requires="p14">
+      <mc:AlternateContent xmlns:mc="http://schemas.openxmlformats.org/markup-compatibility/2006" xmlns:p14="http://schemas.microsoft.com/office/powerpoint/2010/main">
+        <mc:Choice Requires="p14">
           <p:contentPart p14:bwMode="auto" r:id="rId3">
             <p14:nvContentPartPr>
               <p14:cNvPr id="4" name="Ink 3">
@@ -11233,7 +11368,7 @@
             </p14:xfrm>
           </p:contentPart>
         </mc:Choice>
-        <mc:Fallback>
+        <mc:Fallback xmlns="">
           <p:pic>
             <p:nvPicPr>
               <p:cNvPr id="4" name="Ink 3">
@@ -11440,7 +11575,7 @@
         </p:nvSpPr>
         <p:spPr>
           <a:xfrm>
-            <a:off x="3215680" y="5013176"/>
+            <a:off x="3287688" y="4296117"/>
             <a:ext cx="7632848" cy="646331"/>
           </a:xfrm>
           <a:prstGeom prst="rect">
@@ -11543,6 +11678,55 @@
           </a:p>
         </p:txBody>
       </p:sp>
+      <p:sp>
+        <p:nvSpPr>
+          <p:cNvPr id="3" name="TextBox 2">
+            <a:extLst>
+              <a:ext uri="{FF2B5EF4-FFF2-40B4-BE49-F238E27FC236}">
+                <a16:creationId xmlns:a16="http://schemas.microsoft.com/office/drawing/2014/main" id="{9F672A78-04CA-0B03-DD17-79CE04FB419A}"/>
+              </a:ext>
+            </a:extLst>
+          </p:cNvPr>
+          <p:cNvSpPr txBox="1"/>
+          <p:nvPr/>
+        </p:nvSpPr>
+        <p:spPr>
+          <a:xfrm>
+            <a:off x="911424" y="5373216"/>
+            <a:ext cx="8640960" cy="646331"/>
+          </a:xfrm>
+          <a:prstGeom prst="rect">
+            <a:avLst/>
+          </a:prstGeom>
+          <a:solidFill>
+            <a:schemeClr val="accent2"/>
+          </a:solidFill>
+        </p:spPr>
+        <p:txBody>
+          <a:bodyPr wrap="square" rtlCol="0">
+            <a:spAutoFit/>
+          </a:bodyPr>
+          <a:lstStyle/>
+          <a:p>
+            <a:pPr algn="l">
+              <a:lnSpc>
+                <a:spcPct val="90000"/>
+              </a:lnSpc>
+              <a:spcBef>
+                <a:spcPts val="1200"/>
+              </a:spcBef>
+            </a:pPr>
+            <a:r>
+              <a:rPr lang="en-US" sz="2000" dirty="0">
+                <a:solidFill>
+                  <a:srgbClr val="FFFF00"/>
+                </a:solidFill>
+              </a:rPr>
+              <a:t>Think of testing as double entry book-keeping – accounting is subject to single digit errors – just like software.</a:t>
+            </a:r>
+          </a:p>
+        </p:txBody>
+      </p:sp>
     </p:spTree>
     <p:extLst>
       <p:ext uri="{BB962C8B-B14F-4D97-AF65-F5344CB8AC3E}">
@@ -11604,8 +11788,8 @@
           </a:p>
         </p:txBody>
       </p:sp>
-      <mc:AlternateContent xmlns:mc="http://schemas.openxmlformats.org/markup-compatibility/2006">
-        <mc:Choice xmlns:p14="http://schemas.microsoft.com/office/powerpoint/2010/main" Requires="p14">
+      <mc:AlternateContent xmlns:mc="http://schemas.openxmlformats.org/markup-compatibility/2006" xmlns:p14="http://schemas.microsoft.com/office/powerpoint/2010/main">
+        <mc:Choice Requires="p14">
           <p:contentPart p14:bwMode="auto" r:id="rId2">
             <p14:nvContentPartPr>
               <p14:cNvPr id="3" name="Ink 2">
@@ -11624,7 +11808,7 @@
             </p14:xfrm>
           </p:contentPart>
         </mc:Choice>
-        <mc:Fallback>
+        <mc:Fallback xmlns="">
           <p:pic>
             <p:nvPicPr>
               <p:cNvPr id="3" name="Ink 2">
@@ -11655,8 +11839,8 @@
           </p:pic>
         </mc:Fallback>
       </mc:AlternateContent>
-      <mc:AlternateContent xmlns:mc="http://schemas.openxmlformats.org/markup-compatibility/2006">
-        <mc:Choice xmlns:p14="http://schemas.microsoft.com/office/powerpoint/2010/main" Requires="p14">
+      <mc:AlternateContent xmlns:mc="http://schemas.openxmlformats.org/markup-compatibility/2006" xmlns:p14="http://schemas.microsoft.com/office/powerpoint/2010/main">
+        <mc:Choice Requires="p14">
           <p:contentPart p14:bwMode="auto" r:id="rId4">
             <p14:nvContentPartPr>
               <p14:cNvPr id="4" name="Ink 3">
@@ -11675,7 +11859,7 @@
             </p14:xfrm>
           </p:contentPart>
         </mc:Choice>
-        <mc:Fallback>
+        <mc:Fallback xmlns="">
           <p:pic>
             <p:nvPicPr>
               <p:cNvPr id="4" name="Ink 3">
@@ -11706,8 +11890,8 @@
           </p:pic>
         </mc:Fallback>
       </mc:AlternateContent>
-      <mc:AlternateContent xmlns:mc="http://schemas.openxmlformats.org/markup-compatibility/2006">
-        <mc:Choice xmlns:p14="http://schemas.microsoft.com/office/powerpoint/2010/main" Requires="p14">
+      <mc:AlternateContent xmlns:mc="http://schemas.openxmlformats.org/markup-compatibility/2006" xmlns:p14="http://schemas.microsoft.com/office/powerpoint/2010/main">
+        <mc:Choice Requires="p14">
           <p:contentPart p14:bwMode="auto" r:id="rId6">
             <p14:nvContentPartPr>
               <p14:cNvPr id="8" name="Ink 7">
@@ -11726,7 +11910,7 @@
             </p14:xfrm>
           </p:contentPart>
         </mc:Choice>
-        <mc:Fallback>
+        <mc:Fallback xmlns="">
           <p:pic>
             <p:nvPicPr>
               <p:cNvPr id="8" name="Ink 7">
@@ -11757,8 +11941,8 @@
           </p:pic>
         </mc:Fallback>
       </mc:AlternateContent>
-      <mc:AlternateContent xmlns:mc="http://schemas.openxmlformats.org/markup-compatibility/2006">
-        <mc:Choice xmlns:p14="http://schemas.microsoft.com/office/powerpoint/2010/main" Requires="p14">
+      <mc:AlternateContent xmlns:mc="http://schemas.openxmlformats.org/markup-compatibility/2006" xmlns:p14="http://schemas.microsoft.com/office/powerpoint/2010/main">
+        <mc:Choice Requires="p14">
           <p:contentPart p14:bwMode="auto" r:id="rId8">
             <p14:nvContentPartPr>
               <p14:cNvPr id="9" name="Ink 8">
@@ -11777,7 +11961,7 @@
             </p14:xfrm>
           </p:contentPart>
         </mc:Choice>
-        <mc:Fallback>
+        <mc:Fallback xmlns="">
           <p:pic>
             <p:nvPicPr>
               <p:cNvPr id="9" name="Ink 8">
@@ -11808,8 +11992,8 @@
           </p:pic>
         </mc:Fallback>
       </mc:AlternateContent>
-      <mc:AlternateContent xmlns:mc="http://schemas.openxmlformats.org/markup-compatibility/2006">
-        <mc:Choice xmlns:p14="http://schemas.microsoft.com/office/powerpoint/2010/main" Requires="p14">
+      <mc:AlternateContent xmlns:mc="http://schemas.openxmlformats.org/markup-compatibility/2006" xmlns:p14="http://schemas.microsoft.com/office/powerpoint/2010/main">
+        <mc:Choice Requires="p14">
           <p:contentPart p14:bwMode="auto" r:id="rId10">
             <p14:nvContentPartPr>
               <p14:cNvPr id="10" name="Ink 9">
@@ -11828,7 +12012,7 @@
             </p14:xfrm>
           </p:contentPart>
         </mc:Choice>
-        <mc:Fallback>
+        <mc:Fallback xmlns="">
           <p:pic>
             <p:nvPicPr>
               <p:cNvPr id="10" name="Ink 9">
@@ -11859,8 +12043,8 @@
           </p:pic>
         </mc:Fallback>
       </mc:AlternateContent>
-      <mc:AlternateContent xmlns:mc="http://schemas.openxmlformats.org/markup-compatibility/2006">
-        <mc:Choice xmlns:p14="http://schemas.microsoft.com/office/powerpoint/2010/main" Requires="p14">
+      <mc:AlternateContent xmlns:mc="http://schemas.openxmlformats.org/markup-compatibility/2006" xmlns:p14="http://schemas.microsoft.com/office/powerpoint/2010/main">
+        <mc:Choice Requires="p14">
           <p:contentPart p14:bwMode="auto" r:id="rId12">
             <p14:nvContentPartPr>
               <p14:cNvPr id="11" name="Ink 10">
@@ -11879,7 +12063,7 @@
             </p14:xfrm>
           </p:contentPart>
         </mc:Choice>
-        <mc:Fallback>
+        <mc:Fallback xmlns="">
           <p:pic>
             <p:nvPicPr>
               <p:cNvPr id="11" name="Ink 10">
@@ -11910,8 +12094,8 @@
           </p:pic>
         </mc:Fallback>
       </mc:AlternateContent>
-      <mc:AlternateContent xmlns:mc="http://schemas.openxmlformats.org/markup-compatibility/2006">
-        <mc:Choice xmlns:p14="http://schemas.microsoft.com/office/powerpoint/2010/main" Requires="p14">
+      <mc:AlternateContent xmlns:mc="http://schemas.openxmlformats.org/markup-compatibility/2006" xmlns:p14="http://schemas.microsoft.com/office/powerpoint/2010/main">
+        <mc:Choice Requires="p14">
           <p:contentPart p14:bwMode="auto" r:id="rId14">
             <p14:nvContentPartPr>
               <p14:cNvPr id="12" name="Ink 11">
@@ -11930,7 +12114,7 @@
             </p14:xfrm>
           </p:contentPart>
         </mc:Choice>
-        <mc:Fallback>
+        <mc:Fallback xmlns="">
           <p:pic>
             <p:nvPicPr>
               <p:cNvPr id="12" name="Ink 11">
@@ -11961,8 +12145,8 @@
           </p:pic>
         </mc:Fallback>
       </mc:AlternateContent>
-      <mc:AlternateContent xmlns:mc="http://schemas.openxmlformats.org/markup-compatibility/2006">
-        <mc:Choice xmlns:p14="http://schemas.microsoft.com/office/powerpoint/2010/main" Requires="p14">
+      <mc:AlternateContent xmlns:mc="http://schemas.openxmlformats.org/markup-compatibility/2006" xmlns:p14="http://schemas.microsoft.com/office/powerpoint/2010/main">
+        <mc:Choice Requires="p14">
           <p:contentPart p14:bwMode="auto" r:id="rId16">
             <p14:nvContentPartPr>
               <p14:cNvPr id="13" name="Ink 12">
@@ -11981,7 +12165,7 @@
             </p14:xfrm>
           </p:contentPart>
         </mc:Choice>
-        <mc:Fallback>
+        <mc:Fallback xmlns="">
           <p:pic>
             <p:nvPicPr>
               <p:cNvPr id="13" name="Ink 12">
@@ -12032,8 +12216,8 @@
             <a:chExt cx="9983880" cy="2124000"/>
           </a:xfrm>
         </p:grpSpPr>
-        <mc:AlternateContent xmlns:mc="http://schemas.openxmlformats.org/markup-compatibility/2006">
-          <mc:Choice xmlns:p14="http://schemas.microsoft.com/office/powerpoint/2010/main" Requires="p14">
+        <mc:AlternateContent xmlns:mc="http://schemas.openxmlformats.org/markup-compatibility/2006" xmlns:p14="http://schemas.microsoft.com/office/powerpoint/2010/main">
+          <mc:Choice Requires="p14">
             <p:contentPart p14:bwMode="auto" r:id="rId18">
               <p14:nvContentPartPr>
                 <p14:cNvPr id="14" name="Ink 13">
@@ -12052,7 +12236,7 @@
               </p14:xfrm>
             </p:contentPart>
           </mc:Choice>
-          <mc:Fallback>
+          <mc:Fallback xmlns="">
             <p:pic>
               <p:nvPicPr>
                 <p:cNvPr id="14" name="Ink 13">
@@ -12083,8 +12267,8 @@
             </p:pic>
           </mc:Fallback>
         </mc:AlternateContent>
-        <mc:AlternateContent xmlns:mc="http://schemas.openxmlformats.org/markup-compatibility/2006">
-          <mc:Choice xmlns:p14="http://schemas.microsoft.com/office/powerpoint/2010/main" Requires="p14">
+        <mc:AlternateContent xmlns:mc="http://schemas.openxmlformats.org/markup-compatibility/2006" xmlns:p14="http://schemas.microsoft.com/office/powerpoint/2010/main">
+          <mc:Choice Requires="p14">
             <p:contentPart p14:bwMode="auto" r:id="rId20">
               <p14:nvContentPartPr>
                 <p14:cNvPr id="15" name="Ink 14">
@@ -12103,7 +12287,7 @@
               </p14:xfrm>
             </p:contentPart>
           </mc:Choice>
-          <mc:Fallback>
+          <mc:Fallback xmlns="">
             <p:pic>
               <p:nvPicPr>
                 <p:cNvPr id="15" name="Ink 14">
@@ -12134,8 +12318,8 @@
             </p:pic>
           </mc:Fallback>
         </mc:AlternateContent>
-        <mc:AlternateContent xmlns:mc="http://schemas.openxmlformats.org/markup-compatibility/2006">
-          <mc:Choice xmlns:p14="http://schemas.microsoft.com/office/powerpoint/2010/main" Requires="p14">
+        <mc:AlternateContent xmlns:mc="http://schemas.openxmlformats.org/markup-compatibility/2006" xmlns:p14="http://schemas.microsoft.com/office/powerpoint/2010/main">
+          <mc:Choice Requires="p14">
             <p:contentPart p14:bwMode="auto" r:id="rId22">
               <p14:nvContentPartPr>
                 <p14:cNvPr id="17" name="Ink 16">
@@ -12154,7 +12338,7 @@
               </p14:xfrm>
             </p:contentPart>
           </mc:Choice>
-          <mc:Fallback>
+          <mc:Fallback xmlns="">
             <p:pic>
               <p:nvPicPr>
                 <p:cNvPr id="17" name="Ink 16">
@@ -12185,8 +12369,8 @@
             </p:pic>
           </mc:Fallback>
         </mc:AlternateContent>
-        <mc:AlternateContent xmlns:mc="http://schemas.openxmlformats.org/markup-compatibility/2006">
-          <mc:Choice xmlns:p14="http://schemas.microsoft.com/office/powerpoint/2010/main" Requires="p14">
+        <mc:AlternateContent xmlns:mc="http://schemas.openxmlformats.org/markup-compatibility/2006" xmlns:p14="http://schemas.microsoft.com/office/powerpoint/2010/main">
+          <mc:Choice Requires="p14">
             <p:contentPart p14:bwMode="auto" r:id="rId24">
               <p14:nvContentPartPr>
                 <p14:cNvPr id="19" name="Ink 18">
@@ -12205,7 +12389,7 @@
               </p14:xfrm>
             </p:contentPart>
           </mc:Choice>
-          <mc:Fallback>
+          <mc:Fallback xmlns="">
             <p:pic>
               <p:nvPicPr>
                 <p:cNvPr id="19" name="Ink 18">
@@ -12236,8 +12420,8 @@
             </p:pic>
           </mc:Fallback>
         </mc:AlternateContent>
-        <mc:AlternateContent xmlns:mc="http://schemas.openxmlformats.org/markup-compatibility/2006">
-          <mc:Choice xmlns:p14="http://schemas.microsoft.com/office/powerpoint/2010/main" Requires="p14">
+        <mc:AlternateContent xmlns:mc="http://schemas.openxmlformats.org/markup-compatibility/2006" xmlns:p14="http://schemas.microsoft.com/office/powerpoint/2010/main">
+          <mc:Choice Requires="p14">
             <p:contentPart p14:bwMode="auto" r:id="rId26">
               <p14:nvContentPartPr>
                 <p14:cNvPr id="20" name="Ink 19">
@@ -12256,7 +12440,7 @@
               </p14:xfrm>
             </p:contentPart>
           </mc:Choice>
-          <mc:Fallback>
+          <mc:Fallback xmlns="">
             <p:pic>
               <p:nvPicPr>
                 <p:cNvPr id="20" name="Ink 19">
@@ -12287,8 +12471,8 @@
             </p:pic>
           </mc:Fallback>
         </mc:AlternateContent>
-        <mc:AlternateContent xmlns:mc="http://schemas.openxmlformats.org/markup-compatibility/2006">
-          <mc:Choice xmlns:p14="http://schemas.microsoft.com/office/powerpoint/2010/main" Requires="p14">
+        <mc:AlternateContent xmlns:mc="http://schemas.openxmlformats.org/markup-compatibility/2006" xmlns:p14="http://schemas.microsoft.com/office/powerpoint/2010/main">
+          <mc:Choice Requires="p14">
             <p:contentPart p14:bwMode="auto" r:id="rId28">
               <p14:nvContentPartPr>
                 <p14:cNvPr id="22" name="Ink 21">
@@ -12307,7 +12491,7 @@
               </p14:xfrm>
             </p:contentPart>
           </mc:Choice>
-          <mc:Fallback>
+          <mc:Fallback xmlns="">
             <p:pic>
               <p:nvPicPr>
                 <p:cNvPr id="22" name="Ink 21">
@@ -12338,8 +12522,8 @@
             </p:pic>
           </mc:Fallback>
         </mc:AlternateContent>
-        <mc:AlternateContent xmlns:mc="http://schemas.openxmlformats.org/markup-compatibility/2006">
-          <mc:Choice xmlns:p14="http://schemas.microsoft.com/office/powerpoint/2010/main" Requires="p14">
+        <mc:AlternateContent xmlns:mc="http://schemas.openxmlformats.org/markup-compatibility/2006" xmlns:p14="http://schemas.microsoft.com/office/powerpoint/2010/main">
+          <mc:Choice Requires="p14">
             <p:contentPart p14:bwMode="auto" r:id="rId30">
               <p14:nvContentPartPr>
                 <p14:cNvPr id="23" name="Ink 22">
@@ -12358,7 +12542,7 @@
               </p14:xfrm>
             </p:contentPart>
           </mc:Choice>
-          <mc:Fallback>
+          <mc:Fallback xmlns="">
             <p:pic>
               <p:nvPicPr>
                 <p:cNvPr id="23" name="Ink 22">
@@ -12389,8 +12573,8 @@
             </p:pic>
           </mc:Fallback>
         </mc:AlternateContent>
-        <mc:AlternateContent xmlns:mc="http://schemas.openxmlformats.org/markup-compatibility/2006">
-          <mc:Choice xmlns:p14="http://schemas.microsoft.com/office/powerpoint/2010/main" Requires="p14">
+        <mc:AlternateContent xmlns:mc="http://schemas.openxmlformats.org/markup-compatibility/2006" xmlns:p14="http://schemas.microsoft.com/office/powerpoint/2010/main">
+          <mc:Choice Requires="p14">
             <p:contentPart p14:bwMode="auto" r:id="rId32">
               <p14:nvContentPartPr>
                 <p14:cNvPr id="24" name="Ink 23">
@@ -12409,7 +12593,7 @@
               </p14:xfrm>
             </p:contentPart>
           </mc:Choice>
-          <mc:Fallback>
+          <mc:Fallback xmlns="">
             <p:pic>
               <p:nvPicPr>
                 <p:cNvPr id="24" name="Ink 23">
@@ -12440,8 +12624,8 @@
             </p:pic>
           </mc:Fallback>
         </mc:AlternateContent>
-        <mc:AlternateContent xmlns:mc="http://schemas.openxmlformats.org/markup-compatibility/2006">
-          <mc:Choice xmlns:p14="http://schemas.microsoft.com/office/powerpoint/2010/main" Requires="p14">
+        <mc:AlternateContent xmlns:mc="http://schemas.openxmlformats.org/markup-compatibility/2006" xmlns:p14="http://schemas.microsoft.com/office/powerpoint/2010/main">
+          <mc:Choice Requires="p14">
             <p:contentPart p14:bwMode="auto" r:id="rId34">
               <p14:nvContentPartPr>
                 <p14:cNvPr id="26" name="Ink 25">
@@ -12460,7 +12644,7 @@
               </p14:xfrm>
             </p:contentPart>
           </mc:Choice>
-          <mc:Fallback>
+          <mc:Fallback xmlns="">
             <p:pic>
               <p:nvPicPr>
                 <p:cNvPr id="26" name="Ink 25">
@@ -12491,8 +12675,8 @@
             </p:pic>
           </mc:Fallback>
         </mc:AlternateContent>
-        <mc:AlternateContent xmlns:mc="http://schemas.openxmlformats.org/markup-compatibility/2006">
-          <mc:Choice xmlns:p14="http://schemas.microsoft.com/office/powerpoint/2010/main" Requires="p14">
+        <mc:AlternateContent xmlns:mc="http://schemas.openxmlformats.org/markup-compatibility/2006" xmlns:p14="http://schemas.microsoft.com/office/powerpoint/2010/main">
+          <mc:Choice Requires="p14">
             <p:contentPart p14:bwMode="auto" r:id="rId36">
               <p14:nvContentPartPr>
                 <p14:cNvPr id="27" name="Ink 26">
@@ -12511,7 +12695,7 @@
               </p14:xfrm>
             </p:contentPart>
           </mc:Choice>
-          <mc:Fallback>
+          <mc:Fallback xmlns="">
             <p:pic>
               <p:nvPicPr>
                 <p:cNvPr id="27" name="Ink 26">
@@ -12542,8 +12726,8 @@
             </p:pic>
           </mc:Fallback>
         </mc:AlternateContent>
-        <mc:AlternateContent xmlns:mc="http://schemas.openxmlformats.org/markup-compatibility/2006">
-          <mc:Choice xmlns:p14="http://schemas.microsoft.com/office/powerpoint/2010/main" Requires="p14">
+        <mc:AlternateContent xmlns:mc="http://schemas.openxmlformats.org/markup-compatibility/2006" xmlns:p14="http://schemas.microsoft.com/office/powerpoint/2010/main">
+          <mc:Choice Requires="p14">
             <p:contentPart p14:bwMode="auto" r:id="rId38">
               <p14:nvContentPartPr>
                 <p14:cNvPr id="28" name="Ink 27">
@@ -12562,7 +12746,7 @@
               </p14:xfrm>
             </p:contentPart>
           </mc:Choice>
-          <mc:Fallback>
+          <mc:Fallback xmlns="">
             <p:pic>
               <p:nvPicPr>
                 <p:cNvPr id="28" name="Ink 27">
@@ -12593,8 +12777,8 @@
             </p:pic>
           </mc:Fallback>
         </mc:AlternateContent>
-        <mc:AlternateContent xmlns:mc="http://schemas.openxmlformats.org/markup-compatibility/2006">
-          <mc:Choice xmlns:p14="http://schemas.microsoft.com/office/powerpoint/2010/main" Requires="p14">
+        <mc:AlternateContent xmlns:mc="http://schemas.openxmlformats.org/markup-compatibility/2006" xmlns:p14="http://schemas.microsoft.com/office/powerpoint/2010/main">
+          <mc:Choice Requires="p14">
             <p:contentPart p14:bwMode="auto" r:id="rId40">
               <p14:nvContentPartPr>
                 <p14:cNvPr id="29" name="Ink 28">
@@ -12613,7 +12797,7 @@
               </p14:xfrm>
             </p:contentPart>
           </mc:Choice>
-          <mc:Fallback>
+          <mc:Fallback xmlns="">
             <p:pic>
               <p:nvPicPr>
                 <p:cNvPr id="29" name="Ink 28">
@@ -12644,8 +12828,8 @@
             </p:pic>
           </mc:Fallback>
         </mc:AlternateContent>
-        <mc:AlternateContent xmlns:mc="http://schemas.openxmlformats.org/markup-compatibility/2006">
-          <mc:Choice xmlns:p14="http://schemas.microsoft.com/office/powerpoint/2010/main" Requires="p14">
+        <mc:AlternateContent xmlns:mc="http://schemas.openxmlformats.org/markup-compatibility/2006" xmlns:p14="http://schemas.microsoft.com/office/powerpoint/2010/main">
+          <mc:Choice Requires="p14">
             <p:contentPart p14:bwMode="auto" r:id="rId42">
               <p14:nvContentPartPr>
                 <p14:cNvPr id="31" name="Ink 30">
@@ -12664,7 +12848,7 @@
               </p14:xfrm>
             </p:contentPart>
           </mc:Choice>
-          <mc:Fallback>
+          <mc:Fallback xmlns="">
             <p:pic>
               <p:nvPicPr>
                 <p:cNvPr id="31" name="Ink 30">
@@ -12695,8 +12879,8 @@
             </p:pic>
           </mc:Fallback>
         </mc:AlternateContent>
-        <mc:AlternateContent xmlns:mc="http://schemas.openxmlformats.org/markup-compatibility/2006">
-          <mc:Choice xmlns:p14="http://schemas.microsoft.com/office/powerpoint/2010/main" Requires="p14">
+        <mc:AlternateContent xmlns:mc="http://schemas.openxmlformats.org/markup-compatibility/2006" xmlns:p14="http://schemas.microsoft.com/office/powerpoint/2010/main">
+          <mc:Choice Requires="p14">
             <p:contentPart p14:bwMode="auto" r:id="rId44">
               <p14:nvContentPartPr>
                 <p14:cNvPr id="32" name="Ink 31">
@@ -12715,7 +12899,7 @@
               </p14:xfrm>
             </p:contentPart>
           </mc:Choice>
-          <mc:Fallback>
+          <mc:Fallback xmlns="">
             <p:pic>
               <p:nvPicPr>
                 <p:cNvPr id="32" name="Ink 31">
@@ -12746,8 +12930,8 @@
             </p:pic>
           </mc:Fallback>
         </mc:AlternateContent>
-        <mc:AlternateContent xmlns:mc="http://schemas.openxmlformats.org/markup-compatibility/2006">
-          <mc:Choice xmlns:p14="http://schemas.microsoft.com/office/powerpoint/2010/main" Requires="p14">
+        <mc:AlternateContent xmlns:mc="http://schemas.openxmlformats.org/markup-compatibility/2006" xmlns:p14="http://schemas.microsoft.com/office/powerpoint/2010/main">
+          <mc:Choice Requires="p14">
             <p:contentPart p14:bwMode="auto" r:id="rId46">
               <p14:nvContentPartPr>
                 <p14:cNvPr id="33" name="Ink 32">
@@ -12766,7 +12950,7 @@
               </p14:xfrm>
             </p:contentPart>
           </mc:Choice>
-          <mc:Fallback>
+          <mc:Fallback xmlns="">
             <p:pic>
               <p:nvPicPr>
                 <p:cNvPr id="33" name="Ink 32">
@@ -12797,8 +12981,8 @@
             </p:pic>
           </mc:Fallback>
         </mc:AlternateContent>
-        <mc:AlternateContent xmlns:mc="http://schemas.openxmlformats.org/markup-compatibility/2006">
-          <mc:Choice xmlns:p14="http://schemas.microsoft.com/office/powerpoint/2010/main" Requires="p14">
+        <mc:AlternateContent xmlns:mc="http://schemas.openxmlformats.org/markup-compatibility/2006" xmlns:p14="http://schemas.microsoft.com/office/powerpoint/2010/main">
+          <mc:Choice Requires="p14">
             <p:contentPart p14:bwMode="auto" r:id="rId48">
               <p14:nvContentPartPr>
                 <p14:cNvPr id="35" name="Ink 34">
@@ -12817,7 +13001,7 @@
               </p14:xfrm>
             </p:contentPart>
           </mc:Choice>
-          <mc:Fallback>
+          <mc:Fallback xmlns="">
             <p:pic>
               <p:nvPicPr>
                 <p:cNvPr id="35" name="Ink 34">
@@ -12848,8 +13032,8 @@
             </p:pic>
           </mc:Fallback>
         </mc:AlternateContent>
-        <mc:AlternateContent xmlns:mc="http://schemas.openxmlformats.org/markup-compatibility/2006">
-          <mc:Choice xmlns:p14="http://schemas.microsoft.com/office/powerpoint/2010/main" Requires="p14">
+        <mc:AlternateContent xmlns:mc="http://schemas.openxmlformats.org/markup-compatibility/2006" xmlns:p14="http://schemas.microsoft.com/office/powerpoint/2010/main">
+          <mc:Choice Requires="p14">
             <p:contentPart p14:bwMode="auto" r:id="rId50">
               <p14:nvContentPartPr>
                 <p14:cNvPr id="36" name="Ink 35">
@@ -12868,7 +13052,7 @@
               </p14:xfrm>
             </p:contentPart>
           </mc:Choice>
-          <mc:Fallback>
+          <mc:Fallback xmlns="">
             <p:pic>
               <p:nvPicPr>
                 <p:cNvPr id="36" name="Ink 35">
@@ -12899,8 +13083,8 @@
             </p:pic>
           </mc:Fallback>
         </mc:AlternateContent>
-        <mc:AlternateContent xmlns:mc="http://schemas.openxmlformats.org/markup-compatibility/2006">
-          <mc:Choice xmlns:p14="http://schemas.microsoft.com/office/powerpoint/2010/main" Requires="p14">
+        <mc:AlternateContent xmlns:mc="http://schemas.openxmlformats.org/markup-compatibility/2006" xmlns:p14="http://schemas.microsoft.com/office/powerpoint/2010/main">
+          <mc:Choice Requires="p14">
             <p:contentPart p14:bwMode="auto" r:id="rId52">
               <p14:nvContentPartPr>
                 <p14:cNvPr id="37" name="Ink 36">
@@ -12919,7 +13103,7 @@
               </p14:xfrm>
             </p:contentPart>
           </mc:Choice>
-          <mc:Fallback>
+          <mc:Fallback xmlns="">
             <p:pic>
               <p:nvPicPr>
                 <p:cNvPr id="37" name="Ink 36">
@@ -12950,8 +13134,8 @@
             </p:pic>
           </mc:Fallback>
         </mc:AlternateContent>
-        <mc:AlternateContent xmlns:mc="http://schemas.openxmlformats.org/markup-compatibility/2006">
-          <mc:Choice xmlns:p14="http://schemas.microsoft.com/office/powerpoint/2010/main" Requires="p14">
+        <mc:AlternateContent xmlns:mc="http://schemas.openxmlformats.org/markup-compatibility/2006" xmlns:p14="http://schemas.microsoft.com/office/powerpoint/2010/main">
+          <mc:Choice Requires="p14">
             <p:contentPart p14:bwMode="auto" r:id="rId54">
               <p14:nvContentPartPr>
                 <p14:cNvPr id="38" name="Ink 37">
@@ -12970,7 +13154,7 @@
               </p14:xfrm>
             </p:contentPart>
           </mc:Choice>
-          <mc:Fallback>
+          <mc:Fallback xmlns="">
             <p:pic>
               <p:nvPicPr>
                 <p:cNvPr id="38" name="Ink 37">
@@ -13001,8 +13185,8 @@
             </p:pic>
           </mc:Fallback>
         </mc:AlternateContent>
-        <mc:AlternateContent xmlns:mc="http://schemas.openxmlformats.org/markup-compatibility/2006">
-          <mc:Choice xmlns:p14="http://schemas.microsoft.com/office/powerpoint/2010/main" Requires="p14">
+        <mc:AlternateContent xmlns:mc="http://schemas.openxmlformats.org/markup-compatibility/2006" xmlns:p14="http://schemas.microsoft.com/office/powerpoint/2010/main">
+          <mc:Choice Requires="p14">
             <p:contentPart p14:bwMode="auto" r:id="rId56">
               <p14:nvContentPartPr>
                 <p14:cNvPr id="39" name="Ink 38">
@@ -13021,7 +13205,7 @@
               </p14:xfrm>
             </p:contentPart>
           </mc:Choice>
-          <mc:Fallback>
+          <mc:Fallback xmlns="">
             <p:pic>
               <p:nvPicPr>
                 <p:cNvPr id="39" name="Ink 38">
@@ -13052,8 +13236,8 @@
             </p:pic>
           </mc:Fallback>
         </mc:AlternateContent>
-        <mc:AlternateContent xmlns:mc="http://schemas.openxmlformats.org/markup-compatibility/2006">
-          <mc:Choice xmlns:p14="http://schemas.microsoft.com/office/powerpoint/2010/main" Requires="p14">
+        <mc:AlternateContent xmlns:mc="http://schemas.openxmlformats.org/markup-compatibility/2006" xmlns:p14="http://schemas.microsoft.com/office/powerpoint/2010/main">
+          <mc:Choice Requires="p14">
             <p:contentPart p14:bwMode="auto" r:id="rId58">
               <p14:nvContentPartPr>
                 <p14:cNvPr id="41" name="Ink 40">
@@ -13072,7 +13256,7 @@
               </p14:xfrm>
             </p:contentPart>
           </mc:Choice>
-          <mc:Fallback>
+          <mc:Fallback xmlns="">
             <p:pic>
               <p:nvPicPr>
                 <p:cNvPr id="41" name="Ink 40">
@@ -13103,8 +13287,8 @@
             </p:pic>
           </mc:Fallback>
         </mc:AlternateContent>
-        <mc:AlternateContent xmlns:mc="http://schemas.openxmlformats.org/markup-compatibility/2006">
-          <mc:Choice xmlns:p14="http://schemas.microsoft.com/office/powerpoint/2010/main" Requires="p14">
+        <mc:AlternateContent xmlns:mc="http://schemas.openxmlformats.org/markup-compatibility/2006" xmlns:p14="http://schemas.microsoft.com/office/powerpoint/2010/main">
+          <mc:Choice Requires="p14">
             <p:contentPart p14:bwMode="auto" r:id="rId60">
               <p14:nvContentPartPr>
                 <p14:cNvPr id="43" name="Ink 42">
@@ -13123,7 +13307,7 @@
               </p14:xfrm>
             </p:contentPart>
           </mc:Choice>
-          <mc:Fallback>
+          <mc:Fallback xmlns="">
             <p:pic>
               <p:nvPicPr>
                 <p:cNvPr id="43" name="Ink 42">
@@ -13154,8 +13338,8 @@
             </p:pic>
           </mc:Fallback>
         </mc:AlternateContent>
-        <mc:AlternateContent xmlns:mc="http://schemas.openxmlformats.org/markup-compatibility/2006">
-          <mc:Choice xmlns:p14="http://schemas.microsoft.com/office/powerpoint/2010/main" Requires="p14">
+        <mc:AlternateContent xmlns:mc="http://schemas.openxmlformats.org/markup-compatibility/2006" xmlns:p14="http://schemas.microsoft.com/office/powerpoint/2010/main">
+          <mc:Choice Requires="p14">
             <p:contentPart p14:bwMode="auto" r:id="rId62">
               <p14:nvContentPartPr>
                 <p14:cNvPr id="44" name="Ink 43">
@@ -13174,7 +13358,7 @@
               </p14:xfrm>
             </p:contentPart>
           </mc:Choice>
-          <mc:Fallback>
+          <mc:Fallback xmlns="">
             <p:pic>
               <p:nvPicPr>
                 <p:cNvPr id="44" name="Ink 43">
@@ -13205,8 +13389,8 @@
             </p:pic>
           </mc:Fallback>
         </mc:AlternateContent>
-        <mc:AlternateContent xmlns:mc="http://schemas.openxmlformats.org/markup-compatibility/2006">
-          <mc:Choice xmlns:p14="http://schemas.microsoft.com/office/powerpoint/2010/main" Requires="p14">
+        <mc:AlternateContent xmlns:mc="http://schemas.openxmlformats.org/markup-compatibility/2006" xmlns:p14="http://schemas.microsoft.com/office/powerpoint/2010/main">
+          <mc:Choice Requires="p14">
             <p:contentPart p14:bwMode="auto" r:id="rId64">
               <p14:nvContentPartPr>
                 <p14:cNvPr id="45" name="Ink 44">
@@ -13225,7 +13409,7 @@
               </p14:xfrm>
             </p:contentPart>
           </mc:Choice>
-          <mc:Fallback>
+          <mc:Fallback xmlns="">
             <p:pic>
               <p:nvPicPr>
                 <p:cNvPr id="45" name="Ink 44">
@@ -13277,8 +13461,8 @@
             <a:chExt cx="6862320" cy="1005840"/>
           </a:xfrm>
         </p:grpSpPr>
-        <mc:AlternateContent xmlns:mc="http://schemas.openxmlformats.org/markup-compatibility/2006">
-          <mc:Choice xmlns:p14="http://schemas.microsoft.com/office/powerpoint/2010/main" Requires="p14">
+        <mc:AlternateContent xmlns:mc="http://schemas.openxmlformats.org/markup-compatibility/2006" xmlns:p14="http://schemas.microsoft.com/office/powerpoint/2010/main">
+          <mc:Choice Requires="p14">
             <p:contentPart p14:bwMode="auto" r:id="rId66">
               <p14:nvContentPartPr>
                 <p14:cNvPr id="47" name="Ink 46">
@@ -13297,7 +13481,7 @@
               </p14:xfrm>
             </p:contentPart>
           </mc:Choice>
-          <mc:Fallback>
+          <mc:Fallback xmlns="">
             <p:pic>
               <p:nvPicPr>
                 <p:cNvPr id="47" name="Ink 46">
@@ -13328,8 +13512,8 @@
             </p:pic>
           </mc:Fallback>
         </mc:AlternateContent>
-        <mc:AlternateContent xmlns:mc="http://schemas.openxmlformats.org/markup-compatibility/2006">
-          <mc:Choice xmlns:p14="http://schemas.microsoft.com/office/powerpoint/2010/main" Requires="p14">
+        <mc:AlternateContent xmlns:mc="http://schemas.openxmlformats.org/markup-compatibility/2006" xmlns:p14="http://schemas.microsoft.com/office/powerpoint/2010/main">
+          <mc:Choice Requires="p14">
             <p:contentPart p14:bwMode="auto" r:id="rId68">
               <p14:nvContentPartPr>
                 <p14:cNvPr id="48" name="Ink 47">
@@ -13348,7 +13532,7 @@
               </p14:xfrm>
             </p:contentPart>
           </mc:Choice>
-          <mc:Fallback>
+          <mc:Fallback xmlns="">
             <p:pic>
               <p:nvPicPr>
                 <p:cNvPr id="48" name="Ink 47">
@@ -13379,8 +13563,8 @@
             </p:pic>
           </mc:Fallback>
         </mc:AlternateContent>
-        <mc:AlternateContent xmlns:mc="http://schemas.openxmlformats.org/markup-compatibility/2006">
-          <mc:Choice xmlns:p14="http://schemas.microsoft.com/office/powerpoint/2010/main" Requires="p14">
+        <mc:AlternateContent xmlns:mc="http://schemas.openxmlformats.org/markup-compatibility/2006" xmlns:p14="http://schemas.microsoft.com/office/powerpoint/2010/main">
+          <mc:Choice Requires="p14">
             <p:contentPart p14:bwMode="auto" r:id="rId70">
               <p14:nvContentPartPr>
                 <p14:cNvPr id="49" name="Ink 48">
@@ -13399,7 +13583,7 @@
               </p14:xfrm>
             </p:contentPart>
           </mc:Choice>
-          <mc:Fallback>
+          <mc:Fallback xmlns="">
             <p:pic>
               <p:nvPicPr>
                 <p:cNvPr id="49" name="Ink 48">
@@ -13430,8 +13614,8 @@
             </p:pic>
           </mc:Fallback>
         </mc:AlternateContent>
-        <mc:AlternateContent xmlns:mc="http://schemas.openxmlformats.org/markup-compatibility/2006">
-          <mc:Choice xmlns:p14="http://schemas.microsoft.com/office/powerpoint/2010/main" Requires="p14">
+        <mc:AlternateContent xmlns:mc="http://schemas.openxmlformats.org/markup-compatibility/2006" xmlns:p14="http://schemas.microsoft.com/office/powerpoint/2010/main">
+          <mc:Choice Requires="p14">
             <p:contentPart p14:bwMode="auto" r:id="rId72">
               <p14:nvContentPartPr>
                 <p14:cNvPr id="50" name="Ink 49">
@@ -13450,7 +13634,7 @@
               </p14:xfrm>
             </p:contentPart>
           </mc:Choice>
-          <mc:Fallback>
+          <mc:Fallback xmlns="">
             <p:pic>
               <p:nvPicPr>
                 <p:cNvPr id="50" name="Ink 49">
@@ -13481,8 +13665,8 @@
             </p:pic>
           </mc:Fallback>
         </mc:AlternateContent>
-        <mc:AlternateContent xmlns:mc="http://schemas.openxmlformats.org/markup-compatibility/2006">
-          <mc:Choice xmlns:p14="http://schemas.microsoft.com/office/powerpoint/2010/main" Requires="p14">
+        <mc:AlternateContent xmlns:mc="http://schemas.openxmlformats.org/markup-compatibility/2006" xmlns:p14="http://schemas.microsoft.com/office/powerpoint/2010/main">
+          <mc:Choice Requires="p14">
             <p:contentPart p14:bwMode="auto" r:id="rId74">
               <p14:nvContentPartPr>
                 <p14:cNvPr id="51" name="Ink 50">
@@ -13501,7 +13685,7 @@
               </p14:xfrm>
             </p:contentPart>
           </mc:Choice>
-          <mc:Fallback>
+          <mc:Fallback xmlns="">
             <p:pic>
               <p:nvPicPr>
                 <p:cNvPr id="51" name="Ink 50">
@@ -13532,8 +13716,8 @@
             </p:pic>
           </mc:Fallback>
         </mc:AlternateContent>
-        <mc:AlternateContent xmlns:mc="http://schemas.openxmlformats.org/markup-compatibility/2006">
-          <mc:Choice xmlns:p14="http://schemas.microsoft.com/office/powerpoint/2010/main" Requires="p14">
+        <mc:AlternateContent xmlns:mc="http://schemas.openxmlformats.org/markup-compatibility/2006" xmlns:p14="http://schemas.microsoft.com/office/powerpoint/2010/main">
+          <mc:Choice Requires="p14">
             <p:contentPart p14:bwMode="auto" r:id="rId76">
               <p14:nvContentPartPr>
                 <p14:cNvPr id="53" name="Ink 52">
@@ -13552,7 +13736,7 @@
               </p14:xfrm>
             </p:contentPart>
           </mc:Choice>
-          <mc:Fallback>
+          <mc:Fallback xmlns="">
             <p:pic>
               <p:nvPicPr>
                 <p:cNvPr id="53" name="Ink 52">
@@ -13583,8 +13767,8 @@
             </p:pic>
           </mc:Fallback>
         </mc:AlternateContent>
-        <mc:AlternateContent xmlns:mc="http://schemas.openxmlformats.org/markup-compatibility/2006">
-          <mc:Choice xmlns:p14="http://schemas.microsoft.com/office/powerpoint/2010/main" Requires="p14">
+        <mc:AlternateContent xmlns:mc="http://schemas.openxmlformats.org/markup-compatibility/2006" xmlns:p14="http://schemas.microsoft.com/office/powerpoint/2010/main">
+          <mc:Choice Requires="p14">
             <p:contentPart p14:bwMode="auto" r:id="rId78">
               <p14:nvContentPartPr>
                 <p14:cNvPr id="54" name="Ink 53">
@@ -13603,7 +13787,7 @@
               </p14:xfrm>
             </p:contentPart>
           </mc:Choice>
-          <mc:Fallback>
+          <mc:Fallback xmlns="">
             <p:pic>
               <p:nvPicPr>
                 <p:cNvPr id="54" name="Ink 53">
@@ -13634,8 +13818,8 @@
             </p:pic>
           </mc:Fallback>
         </mc:AlternateContent>
-        <mc:AlternateContent xmlns:mc="http://schemas.openxmlformats.org/markup-compatibility/2006">
-          <mc:Choice xmlns:p14="http://schemas.microsoft.com/office/powerpoint/2010/main" Requires="p14">
+        <mc:AlternateContent xmlns:mc="http://schemas.openxmlformats.org/markup-compatibility/2006" xmlns:p14="http://schemas.microsoft.com/office/powerpoint/2010/main">
+          <mc:Choice Requires="p14">
             <p:contentPart p14:bwMode="auto" r:id="rId80">
               <p14:nvContentPartPr>
                 <p14:cNvPr id="55" name="Ink 54">
@@ -13654,7 +13838,7 @@
               </p14:xfrm>
             </p:contentPart>
           </mc:Choice>
-          <mc:Fallback>
+          <mc:Fallback xmlns="">
             <p:pic>
               <p:nvPicPr>
                 <p:cNvPr id="55" name="Ink 54">
@@ -13685,8 +13869,8 @@
             </p:pic>
           </mc:Fallback>
         </mc:AlternateContent>
-        <mc:AlternateContent xmlns:mc="http://schemas.openxmlformats.org/markup-compatibility/2006">
-          <mc:Choice xmlns:p14="http://schemas.microsoft.com/office/powerpoint/2010/main" Requires="p14">
+        <mc:AlternateContent xmlns:mc="http://schemas.openxmlformats.org/markup-compatibility/2006" xmlns:p14="http://schemas.microsoft.com/office/powerpoint/2010/main">
+          <mc:Choice Requires="p14">
             <p:contentPart p14:bwMode="auto" r:id="rId82">
               <p14:nvContentPartPr>
                 <p14:cNvPr id="56" name="Ink 55">
@@ -13705,7 +13889,7 @@
               </p14:xfrm>
             </p:contentPart>
           </mc:Choice>
-          <mc:Fallback>
+          <mc:Fallback xmlns="">
             <p:pic>
               <p:nvPicPr>
                 <p:cNvPr id="56" name="Ink 55">
@@ -13736,8 +13920,8 @@
             </p:pic>
           </mc:Fallback>
         </mc:AlternateContent>
-        <mc:AlternateContent xmlns:mc="http://schemas.openxmlformats.org/markup-compatibility/2006">
-          <mc:Choice xmlns:p14="http://schemas.microsoft.com/office/powerpoint/2010/main" Requires="p14">
+        <mc:AlternateContent xmlns:mc="http://schemas.openxmlformats.org/markup-compatibility/2006" xmlns:p14="http://schemas.microsoft.com/office/powerpoint/2010/main">
+          <mc:Choice Requires="p14">
             <p:contentPart p14:bwMode="auto" r:id="rId84">
               <p14:nvContentPartPr>
                 <p14:cNvPr id="57" name="Ink 56">
@@ -13756,7 +13940,7 @@
               </p14:xfrm>
             </p:contentPart>
           </mc:Choice>
-          <mc:Fallback>
+          <mc:Fallback xmlns="">
             <p:pic>
               <p:nvPicPr>
                 <p:cNvPr id="57" name="Ink 56">
@@ -13787,8 +13971,8 @@
             </p:pic>
           </mc:Fallback>
         </mc:AlternateContent>
-        <mc:AlternateContent xmlns:mc="http://schemas.openxmlformats.org/markup-compatibility/2006">
-          <mc:Choice xmlns:p14="http://schemas.microsoft.com/office/powerpoint/2010/main" Requires="p14">
+        <mc:AlternateContent xmlns:mc="http://schemas.openxmlformats.org/markup-compatibility/2006" xmlns:p14="http://schemas.microsoft.com/office/powerpoint/2010/main">
+          <mc:Choice Requires="p14">
             <p:contentPart p14:bwMode="auto" r:id="rId86">
               <p14:nvContentPartPr>
                 <p14:cNvPr id="58" name="Ink 57">
@@ -13807,7 +13991,7 @@
               </p14:xfrm>
             </p:contentPart>
           </mc:Choice>
-          <mc:Fallback>
+          <mc:Fallback xmlns="">
             <p:pic>
               <p:nvPicPr>
                 <p:cNvPr id="58" name="Ink 57">
@@ -13838,8 +14022,8 @@
             </p:pic>
           </mc:Fallback>
         </mc:AlternateContent>
-        <mc:AlternateContent xmlns:mc="http://schemas.openxmlformats.org/markup-compatibility/2006">
-          <mc:Choice xmlns:p14="http://schemas.microsoft.com/office/powerpoint/2010/main" Requires="p14">
+        <mc:AlternateContent xmlns:mc="http://schemas.openxmlformats.org/markup-compatibility/2006" xmlns:p14="http://schemas.microsoft.com/office/powerpoint/2010/main">
+          <mc:Choice Requires="p14">
             <p:contentPart p14:bwMode="auto" r:id="rId88">
               <p14:nvContentPartPr>
                 <p14:cNvPr id="59" name="Ink 58">
@@ -13858,7 +14042,7 @@
               </p14:xfrm>
             </p:contentPart>
           </mc:Choice>
-          <mc:Fallback>
+          <mc:Fallback xmlns="">
             <p:pic>
               <p:nvPicPr>
                 <p:cNvPr id="59" name="Ink 58">
@@ -13889,8 +14073,8 @@
             </p:pic>
           </mc:Fallback>
         </mc:AlternateContent>
-        <mc:AlternateContent xmlns:mc="http://schemas.openxmlformats.org/markup-compatibility/2006">
-          <mc:Choice xmlns:p14="http://schemas.microsoft.com/office/powerpoint/2010/main" Requires="p14">
+        <mc:AlternateContent xmlns:mc="http://schemas.openxmlformats.org/markup-compatibility/2006" xmlns:p14="http://schemas.microsoft.com/office/powerpoint/2010/main">
+          <mc:Choice Requires="p14">
             <p:contentPart p14:bwMode="auto" r:id="rId90">
               <p14:nvContentPartPr>
                 <p14:cNvPr id="60" name="Ink 59">
@@ -13909,7 +14093,7 @@
               </p14:xfrm>
             </p:contentPart>
           </mc:Choice>
-          <mc:Fallback>
+          <mc:Fallback xmlns="">
             <p:pic>
               <p:nvPicPr>
                 <p:cNvPr id="60" name="Ink 59">
@@ -13941,8 +14125,8 @@
           </mc:Fallback>
         </mc:AlternateContent>
       </p:grpSp>
-      <mc:AlternateContent xmlns:mc="http://schemas.openxmlformats.org/markup-compatibility/2006">
-        <mc:Choice xmlns:p14="http://schemas.microsoft.com/office/powerpoint/2010/main" Requires="p14">
+      <mc:AlternateContent xmlns:mc="http://schemas.openxmlformats.org/markup-compatibility/2006" xmlns:p14="http://schemas.microsoft.com/office/powerpoint/2010/main">
+        <mc:Choice Requires="p14">
           <p:contentPart p14:bwMode="auto" r:id="rId92">
             <p14:nvContentPartPr>
               <p14:cNvPr id="62" name="Ink 61">
@@ -13961,7 +14145,7 @@
             </p14:xfrm>
           </p:contentPart>
         </mc:Choice>
-        <mc:Fallback>
+        <mc:Fallback xmlns="">
           <p:pic>
             <p:nvPicPr>
               <p:cNvPr id="62" name="Ink 61">
@@ -14027,47 +14211,190 @@
       </p:grpSpPr>
       <p:sp>
         <p:nvSpPr>
-          <p:cNvPr id="7" name="TextBox 6">
-            <a:extLst>
-              <a:ext uri="{FF2B5EF4-FFF2-40B4-BE49-F238E27FC236}">
-                <a16:creationId xmlns:a16="http://schemas.microsoft.com/office/drawing/2014/main" id="{956C5635-7136-B561-0AB2-E3C1746B4DE6}"/>
-              </a:ext>
-            </a:extLst>
-          </p:cNvPr>
-          <p:cNvSpPr txBox="1"/>
-          <p:nvPr/>
+          <p:cNvPr id="2" name="Title 1">
+            <a:extLst>
+              <a:ext uri="{FF2B5EF4-FFF2-40B4-BE49-F238E27FC236}">
+                <a16:creationId xmlns:a16="http://schemas.microsoft.com/office/drawing/2014/main" id="{D445222D-6AF3-7D42-8A0C-E166E78EA7B5}"/>
+              </a:ext>
+            </a:extLst>
+          </p:cNvPr>
+          <p:cNvSpPr>
+            <a:spLocks noGrp="1"/>
+          </p:cNvSpPr>
+          <p:nvPr>
+            <p:ph type="title"/>
+          </p:nvPr>
+        </p:nvSpPr>
+        <p:spPr/>
+        <p:txBody>
+          <a:bodyPr/>
+          <a:lstStyle/>
+          <a:p>
+            <a:r>
+              <a:rPr lang="en-US" dirty="0"/>
+              <a:t>Objections to TDD</a:t>
+            </a:r>
+          </a:p>
+        </p:txBody>
+      </p:sp>
+      <p:sp>
+        <p:nvSpPr>
+          <p:cNvPr id="3" name="Text Placeholder 2">
+            <a:extLst>
+              <a:ext uri="{FF2B5EF4-FFF2-40B4-BE49-F238E27FC236}">
+                <a16:creationId xmlns:a16="http://schemas.microsoft.com/office/drawing/2014/main" id="{9728DA1B-E402-C934-318C-1F5DBE310D30}"/>
+              </a:ext>
+            </a:extLst>
+          </p:cNvPr>
+          <p:cNvSpPr>
+            <a:spLocks noGrp="1"/>
+          </p:cNvSpPr>
+          <p:nvPr>
+            <p:ph type="body" sz="quarter" idx="10"/>
+          </p:nvPr>
         </p:nvSpPr>
         <p:spPr>
           <a:xfrm>
-            <a:off x="3359696" y="2852936"/>
-            <a:ext cx="4139275" cy="369332"/>
+            <a:off x="191344" y="1371600"/>
+            <a:ext cx="11521440" cy="5029200"/>
           </a:xfrm>
-          <a:prstGeom prst="rect">
-            <a:avLst/>
-          </a:prstGeom>
-          <a:noFill/>
         </p:spPr>
         <p:txBody>
-          <a:bodyPr wrap="none" rtlCol="0">
-            <a:spAutoFit/>
-          </a:bodyPr>
+          <a:bodyPr/>
           <a:lstStyle/>
           <a:p>
-            <a:pPr algn="l">
-              <a:lnSpc>
-                <a:spcPct val="90000"/>
-              </a:lnSpc>
-              <a:spcBef>
-                <a:spcPts val="1200"/>
-              </a:spcBef>
-            </a:pPr>
             <a:r>
-              <a:rPr lang="en-US" sz="2000" dirty="0">
+              <a:rPr lang="en-US" dirty="0">
                 <a:solidFill>
-                  <a:schemeClr val="tx2"/>
+                  <a:srgbClr val="FF0000"/>
                 </a:solidFill>
               </a:rPr>
-              <a:t>Over to the petstore api… tdd style</a:t>
+              <a:t>Tests are more code – it must slow you down.</a:t>
+            </a:r>
+          </a:p>
+          <a:p>
+            <a:pPr lvl="1"/>
+            <a:r>
+              <a:rPr lang="en-US" dirty="0">
+                <a:solidFill>
+                  <a:srgbClr val="002060"/>
+                </a:solidFill>
+              </a:rPr>
+              <a:t>You actually go faster because you will spend much less time debugging.</a:t>
+            </a:r>
+          </a:p>
+          <a:p>
+            <a:pPr lvl="1"/>
+            <a:r>
+              <a:rPr lang="en-US" dirty="0">
+                <a:solidFill>
+                  <a:srgbClr val="002060"/>
+                </a:solidFill>
+              </a:rPr>
+              <a:t>You are constantly working in a clean code base - you can refactor without </a:t>
+            </a:r>
+            <a:r>
+              <a:rPr lang="en-US" dirty="0">
+                <a:solidFill>
+                  <a:srgbClr val="002060"/>
+                </a:solidFill>
+                <a:highlight>
+                  <a:srgbClr val="FFFF00"/>
+                </a:highlight>
+              </a:rPr>
+              <a:t>fear</a:t>
+            </a:r>
+            <a:r>
+              <a:rPr lang="en-US" dirty="0">
+                <a:solidFill>
+                  <a:srgbClr val="002060"/>
+                </a:solidFill>
+              </a:rPr>
+              <a:t>.</a:t>
+            </a:r>
+          </a:p>
+          <a:p>
+            <a:r>
+              <a:rPr lang="en-US" dirty="0">
+                <a:solidFill>
+                  <a:srgbClr val="FF0000"/>
+                </a:solidFill>
+              </a:rPr>
+              <a:t>Mangers raise objections because they think it will take longer.</a:t>
+            </a:r>
+          </a:p>
+          <a:p>
+            <a:pPr lvl="1"/>
+            <a:r>
+              <a:rPr lang="en-US" dirty="0">
+                <a:solidFill>
+                  <a:srgbClr val="002060"/>
+                </a:solidFill>
+              </a:rPr>
+              <a:t>Just don’t tell them, you don’t tell them about other ways you code.</a:t>
+            </a:r>
+          </a:p>
+          <a:p>
+            <a:r>
+              <a:rPr lang="en-US" dirty="0">
+                <a:solidFill>
+                  <a:srgbClr val="FF0000"/>
+                </a:solidFill>
+              </a:rPr>
+              <a:t>Refactoring is rework, it would be better to write the code right the first time.</a:t>
+            </a:r>
+          </a:p>
+          <a:p>
+            <a:pPr lvl="1"/>
+            <a:r>
+              <a:rPr lang="en-US" dirty="0">
+                <a:solidFill>
+                  <a:srgbClr val="002060"/>
+                </a:solidFill>
+              </a:rPr>
+              <a:t>All creative work is done iteratively: art, literature etc.</a:t>
+            </a:r>
+          </a:p>
+          <a:p>
+            <a:r>
+              <a:rPr lang="en-US" dirty="0">
+                <a:solidFill>
+                  <a:srgbClr val="FF0000"/>
+                </a:solidFill>
+              </a:rPr>
+              <a:t>Who tests the tests?</a:t>
+            </a:r>
+          </a:p>
+          <a:p>
+            <a:pPr lvl="1"/>
+            <a:r>
+              <a:rPr lang="en-US" dirty="0">
+                <a:solidFill>
+                  <a:srgbClr val="002060"/>
+                </a:solidFill>
+              </a:rPr>
+              <a:t>The production code tests the tests.</a:t>
+            </a:r>
+          </a:p>
+          <a:p>
+            <a:r>
+              <a:rPr lang="en-US" dirty="0">
+                <a:solidFill>
+                  <a:srgbClr val="FF0000"/>
+                </a:solidFill>
+              </a:rPr>
+              <a:t>A small change to code breaks lots of tests.</a:t>
+            </a:r>
+          </a:p>
+          <a:p>
+            <a:pPr lvl="1"/>
+            <a:r>
+              <a:rPr lang="en-US" dirty="0">
+                <a:solidFill>
+                  <a:srgbClr val="002060"/>
+                </a:solidFill>
+              </a:rPr>
+              <a:t>If tests are testing implementation and / or are poorly designed they will break frequently (too coupled to the production code). Aim to test the public api – e.g. Petstore</a:t>
             </a:r>
           </a:p>
         </p:txBody>
@@ -14075,7 +14402,7 @@
     </p:spTree>
     <p:extLst>
       <p:ext uri="{BB962C8B-B14F-4D97-AF65-F5344CB8AC3E}">
-        <p14:creationId xmlns:p14="http://schemas.microsoft.com/office/powerpoint/2010/main" val="1874779188"/>
+        <p14:creationId xmlns:p14="http://schemas.microsoft.com/office/powerpoint/2010/main" val="1797058624"/>
       </p:ext>
     </p:extLst>
   </p:cSld>
@@ -14105,13 +14432,309 @@
           <a:chExt cx="0" cy="0"/>
         </a:xfrm>
       </p:grpSpPr>
+      <p:sp>
+        <p:nvSpPr>
+          <p:cNvPr id="2" name="Title 1">
+            <a:extLst>
+              <a:ext uri="{FF2B5EF4-FFF2-40B4-BE49-F238E27FC236}">
+                <a16:creationId xmlns:a16="http://schemas.microsoft.com/office/drawing/2014/main" id="{D445222D-6AF3-7D42-8A0C-E166E78EA7B5}"/>
+              </a:ext>
+            </a:extLst>
+          </p:cNvPr>
+          <p:cNvSpPr>
+            <a:spLocks noGrp="1"/>
+          </p:cNvSpPr>
+          <p:nvPr>
+            <p:ph type="title"/>
+          </p:nvPr>
+        </p:nvSpPr>
+        <p:spPr/>
+        <p:txBody>
+          <a:bodyPr/>
+          <a:lstStyle/>
+          <a:p>
+            <a:r>
+              <a:rPr lang="en-US" dirty="0"/>
+              <a:t>Objections to TDD </a:t>
+            </a:r>
+            <a:r>
+              <a:rPr lang="en-US" dirty="0" err="1"/>
+              <a:t>cont</a:t>
+            </a:r>
+            <a:r>
+              <a:rPr lang="en-US" dirty="0"/>
+              <a:t>…</a:t>
+            </a:r>
+          </a:p>
+        </p:txBody>
+      </p:sp>
+      <p:sp>
+        <p:nvSpPr>
+          <p:cNvPr id="3" name="Text Placeholder 2">
+            <a:extLst>
+              <a:ext uri="{FF2B5EF4-FFF2-40B4-BE49-F238E27FC236}">
+                <a16:creationId xmlns:a16="http://schemas.microsoft.com/office/drawing/2014/main" id="{9728DA1B-E402-C934-318C-1F5DBE310D30}"/>
+              </a:ext>
+            </a:extLst>
+          </p:cNvPr>
+          <p:cNvSpPr>
+            <a:spLocks noGrp="1"/>
+          </p:cNvSpPr>
+          <p:nvPr>
+            <p:ph type="body" sz="quarter" idx="10"/>
+          </p:nvPr>
+        </p:nvSpPr>
+        <p:spPr>
+          <a:xfrm>
+            <a:off x="191344" y="1371600"/>
+            <a:ext cx="11521440" cy="5029200"/>
+          </a:xfrm>
+        </p:spPr>
+        <p:txBody>
+          <a:bodyPr/>
+          <a:lstStyle/>
+          <a:p>
+            <a:r>
+              <a:rPr lang="en-US" dirty="0">
+                <a:solidFill>
+                  <a:srgbClr val="FF0000"/>
+                </a:solidFill>
+              </a:rPr>
+              <a:t>Tests can’t prove the code correct</a:t>
+            </a:r>
+          </a:p>
+          <a:p>
+            <a:pPr lvl="1"/>
+            <a:r>
+              <a:rPr lang="en-US" dirty="0">
+                <a:solidFill>
+                  <a:srgbClr val="002060"/>
+                </a:solidFill>
+              </a:rPr>
+              <a:t>The purpose of tests is to create a parachute – eliminate the fear of making change.</a:t>
+            </a:r>
+          </a:p>
+          <a:p>
+            <a:r>
+              <a:rPr lang="en-US" dirty="0">
+                <a:solidFill>
+                  <a:srgbClr val="FF0000"/>
+                </a:solidFill>
+              </a:rPr>
+              <a:t>You can write your tests after the code.</a:t>
+            </a:r>
+          </a:p>
+          <a:p>
+            <a:pPr lvl="1"/>
+            <a:r>
+              <a:rPr lang="en-US" dirty="0">
+                <a:solidFill>
+                  <a:srgbClr val="002060"/>
+                </a:solidFill>
+              </a:rPr>
+              <a:t>Things that come at the end are less important - tests can be missed out.</a:t>
+            </a:r>
+          </a:p>
+          <a:p>
+            <a:pPr lvl="1"/>
+            <a:r>
+              <a:rPr lang="en-US" dirty="0">
+                <a:solidFill>
+                  <a:srgbClr val="002060"/>
+                </a:solidFill>
+              </a:rPr>
+              <a:t>The tests are more important than the code – they stop the code from rotting, they are also the requirements.</a:t>
+            </a:r>
+          </a:p>
+          <a:p>
+            <a:r>
+              <a:rPr lang="en-US" dirty="0">
+                <a:solidFill>
+                  <a:srgbClr val="FF0000"/>
+                </a:solidFill>
+              </a:rPr>
+              <a:t>Testing GUIs.</a:t>
+            </a:r>
+          </a:p>
+          <a:p>
+            <a:pPr lvl="1"/>
+            <a:r>
+              <a:rPr lang="en-US" dirty="0">
+                <a:solidFill>
+                  <a:srgbClr val="002060"/>
+                </a:solidFill>
+              </a:rPr>
+              <a:t>Avoid testing GUIs. Test the code one layer back from that – separate the GUI into the presenter and the view. Then test the presenter.</a:t>
+            </a:r>
+          </a:p>
+        </p:txBody>
+      </p:sp>
     </p:spTree>
-    <p:custDataLst>
-      <p:tags r:id="rId1"/>
-    </p:custDataLst>
     <p:extLst>
       <p:ext uri="{BB962C8B-B14F-4D97-AF65-F5344CB8AC3E}">
-        <p14:creationId xmlns:p14="http://schemas.microsoft.com/office/powerpoint/2010/main" val="1524910866"/>
+        <p14:creationId xmlns:p14="http://schemas.microsoft.com/office/powerpoint/2010/main" val="1798698874"/>
+      </p:ext>
+    </p:extLst>
+  </p:cSld>
+  <p:clrMapOvr>
+    <a:masterClrMapping/>
+  </p:clrMapOvr>
+  <p:transition>
+    <p:fade/>
+  </p:transition>
+</p:sld>
+</file>
+
+<file path=ppt/slides/slide9.xml><?xml version="1.0" encoding="utf-8"?>
+<p:sld xmlns:a="http://schemas.openxmlformats.org/drawingml/2006/main" xmlns:r="http://schemas.openxmlformats.org/officeDocument/2006/relationships" xmlns:p="http://schemas.openxmlformats.org/presentationml/2006/main">
+  <p:cSld>
+    <p:spTree>
+      <p:nvGrpSpPr>
+        <p:cNvPr id="1" name=""/>
+        <p:cNvGrpSpPr/>
+        <p:nvPr/>
+      </p:nvGrpSpPr>
+      <p:grpSpPr>
+        <a:xfrm>
+          <a:off x="0" y="0"/>
+          <a:ext cx="0" cy="0"/>
+          <a:chOff x="0" y="0"/>
+          <a:chExt cx="0" cy="0"/>
+        </a:xfrm>
+      </p:grpSpPr>
+      <p:sp>
+        <p:nvSpPr>
+          <p:cNvPr id="2" name="Title 1">
+            <a:extLst>
+              <a:ext uri="{FF2B5EF4-FFF2-40B4-BE49-F238E27FC236}">
+                <a16:creationId xmlns:a16="http://schemas.microsoft.com/office/drawing/2014/main" id="{D445222D-6AF3-7D42-8A0C-E166E78EA7B5}"/>
+              </a:ext>
+            </a:extLst>
+          </p:cNvPr>
+          <p:cNvSpPr>
+            <a:spLocks noGrp="1"/>
+          </p:cNvSpPr>
+          <p:nvPr>
+            <p:ph type="title"/>
+          </p:nvPr>
+        </p:nvSpPr>
+        <p:spPr/>
+        <p:txBody>
+          <a:bodyPr/>
+          <a:lstStyle/>
+          <a:p>
+            <a:r>
+              <a:rPr lang="en-US" dirty="0"/>
+              <a:t>Code Coverage</a:t>
+            </a:r>
+          </a:p>
+        </p:txBody>
+      </p:sp>
+      <p:sp>
+        <p:nvSpPr>
+          <p:cNvPr id="6" name="TextBox 5">
+            <a:extLst>
+              <a:ext uri="{FF2B5EF4-FFF2-40B4-BE49-F238E27FC236}">
+                <a16:creationId xmlns:a16="http://schemas.microsoft.com/office/drawing/2014/main" id="{0557F998-2766-6EDD-0A4D-503AEF0D433D}"/>
+              </a:ext>
+            </a:extLst>
+          </p:cNvPr>
+          <p:cNvSpPr txBox="1"/>
+          <p:nvPr/>
+        </p:nvSpPr>
+        <p:spPr>
+          <a:xfrm>
+            <a:off x="3719736" y="1484784"/>
+            <a:ext cx="3092513" cy="369332"/>
+          </a:xfrm>
+          <a:prstGeom prst="rect">
+            <a:avLst/>
+          </a:prstGeom>
+          <a:solidFill>
+            <a:schemeClr val="accent5">
+              <a:lumMod val="20000"/>
+              <a:lumOff val="80000"/>
+            </a:schemeClr>
+          </a:solidFill>
+        </p:spPr>
+        <p:txBody>
+          <a:bodyPr wrap="none" rtlCol="0">
+            <a:spAutoFit/>
+          </a:bodyPr>
+          <a:lstStyle/>
+          <a:p>
+            <a:pPr algn="l">
+              <a:lnSpc>
+                <a:spcPct val="90000"/>
+              </a:lnSpc>
+              <a:spcBef>
+                <a:spcPts val="1200"/>
+              </a:spcBef>
+            </a:pPr>
+            <a:r>
+              <a:rPr lang="en-US" sz="2000" dirty="0">
+                <a:solidFill>
+                  <a:schemeClr val="tx2"/>
+                </a:solidFill>
+              </a:rPr>
+              <a:t>The goal should be 100%</a:t>
+            </a:r>
+          </a:p>
+        </p:txBody>
+      </p:sp>
+      <p:sp>
+        <p:nvSpPr>
+          <p:cNvPr id="7" name="TextBox 6">
+            <a:extLst>
+              <a:ext uri="{FF2B5EF4-FFF2-40B4-BE49-F238E27FC236}">
+                <a16:creationId xmlns:a16="http://schemas.microsoft.com/office/drawing/2014/main" id="{5FA5C330-E464-80BE-7EA2-5AAEEAF1BAB1}"/>
+              </a:ext>
+            </a:extLst>
+          </p:cNvPr>
+          <p:cNvSpPr txBox="1"/>
+          <p:nvPr/>
+        </p:nvSpPr>
+        <p:spPr>
+          <a:xfrm>
+            <a:off x="2279576" y="2204864"/>
+            <a:ext cx="7008650" cy="369332"/>
+          </a:xfrm>
+          <a:prstGeom prst="rect">
+            <a:avLst/>
+          </a:prstGeom>
+          <a:solidFill>
+            <a:srgbClr val="D883FF"/>
+          </a:solidFill>
+        </p:spPr>
+        <p:txBody>
+          <a:bodyPr wrap="none" rtlCol="0">
+            <a:spAutoFit/>
+          </a:bodyPr>
+          <a:lstStyle/>
+          <a:p>
+            <a:pPr algn="l">
+              <a:lnSpc>
+                <a:spcPct val="90000"/>
+              </a:lnSpc>
+              <a:spcBef>
+                <a:spcPts val="1200"/>
+              </a:spcBef>
+            </a:pPr>
+            <a:r>
+              <a:rPr lang="en-US" sz="2000" dirty="0">
+                <a:solidFill>
+                  <a:srgbClr val="48ED00"/>
+                </a:solidFill>
+              </a:rPr>
+              <a:t>This is almost never achievable, but it should still be the goal</a:t>
+            </a:r>
+          </a:p>
+        </p:txBody>
+      </p:sp>
+    </p:spTree>
+    <p:extLst>
+      <p:ext uri="{BB962C8B-B14F-4D97-AF65-F5344CB8AC3E}">
+        <p14:creationId xmlns:p14="http://schemas.microsoft.com/office/powerpoint/2010/main" val="1120657442"/>
       </p:ext>
     </p:extLst>
   </p:cSld>
@@ -14912,35 +15535,6 @@
 </file>
 
 <file path=customXml/item1.xml><?xml version="1.0" encoding="utf-8"?>
-<p:properties xmlns:p="http://schemas.microsoft.com/office/2006/metadata/properties" xmlns:xsi="http://www.w3.org/2001/XMLSchema-instance" xmlns:pc="http://schemas.microsoft.com/office/infopath/2007/PartnerControls">
-  <documentManagement>
-    <SharedWithUsers xmlns="846e726d-930d-4acb-bd80-f2077a598691">
-      <UserInfo>
-        <DisplayName>Rohit Rahim</DisplayName>
-        <AccountId>76190</AccountId>
-        <AccountType/>
-      </UserInfo>
-      <UserInfo>
-        <DisplayName>Leo Zhang</DisplayName>
-        <AccountId>76198</AccountId>
-        <AccountType/>
-      </UserInfo>
-      <UserInfo>
-        <DisplayName>Ebony Cherry</DisplayName>
-        <AccountId>76895</AccountId>
-        <AccountType/>
-      </UserInfo>
-      <UserInfo>
-        <DisplayName>Joan Castro</DisplayName>
-        <AccountId>76253</AccountId>
-        <AccountType/>
-      </UserInfo>
-    </SharedWithUsers>
-  </documentManagement>
-</p:properties>
-</file>
-
-<file path=customXml/item2.xml><?xml version="1.0" encoding="utf-8"?>
 <ct:contentTypeSchema xmlns:ct="http://schemas.microsoft.com/office/2006/metadata/contentType" xmlns:ma="http://schemas.microsoft.com/office/2006/metadata/properties/metaAttributes" ct:_="" ma:_="" ma:contentTypeName="Document" ma:contentTypeID="0x01010039F82FE1962BF246BB3FD51399502091" ma:contentTypeVersion="4" ma:contentTypeDescription="Create a new document." ma:contentTypeScope="" ma:versionID="a8c673c98f8b2fb74a666da82b1c2089">
   <xsd:schema xmlns:xsd="http://www.w3.org/2001/XMLSchema" xmlns:xs="http://www.w3.org/2001/XMLSchema" xmlns:p="http://schemas.microsoft.com/office/2006/metadata/properties" xmlns:ns2="87a905cf-b897-4a15-b4dd-a8e6e281c28b" xmlns:ns3="846e726d-930d-4acb-bd80-f2077a598691" targetNamespace="http://schemas.microsoft.com/office/2006/metadata/properties" ma:root="true" ma:fieldsID="5fda6c7244f85a62871e6aeadce43f09" ns2:_="" ns3:_="">
     <xsd:import namespace="87a905cf-b897-4a15-b4dd-a8e6e281c28b"/>
@@ -15105,6 +15699,35 @@
 </ct:contentTypeSchema>
 </file>
 
+<file path=customXml/item2.xml><?xml version="1.0" encoding="utf-8"?>
+<p:properties xmlns:p="http://schemas.microsoft.com/office/2006/metadata/properties" xmlns:xsi="http://www.w3.org/2001/XMLSchema-instance" xmlns:pc="http://schemas.microsoft.com/office/infopath/2007/PartnerControls">
+  <documentManagement>
+    <SharedWithUsers xmlns="846e726d-930d-4acb-bd80-f2077a598691">
+      <UserInfo>
+        <DisplayName>Rohit Rahim</DisplayName>
+        <AccountId>76190</AccountId>
+        <AccountType/>
+      </UserInfo>
+      <UserInfo>
+        <DisplayName>Leo Zhang</DisplayName>
+        <AccountId>76198</AccountId>
+        <AccountType/>
+      </UserInfo>
+      <UserInfo>
+        <DisplayName>Ebony Cherry</DisplayName>
+        <AccountId>76895</AccountId>
+        <AccountType/>
+      </UserInfo>
+      <UserInfo>
+        <DisplayName>Joan Castro</DisplayName>
+        <AccountId>76253</AccountId>
+        <AccountType/>
+      </UserInfo>
+    </SharedWithUsers>
+  </documentManagement>
+</p:properties>
+</file>
+
 <file path=customXml/item3.xml><?xml version="1.0" encoding="utf-8"?>
 <?mso-contentType ?>
 <FormTemplates xmlns="http://schemas.microsoft.com/sharepoint/v3/contenttype/forms">
@@ -15115,16 +15738,6 @@
 </file>
 
 <file path=customXml/itemProps1.xml><?xml version="1.0" encoding="utf-8"?>
-<ds:datastoreItem xmlns:ds="http://schemas.openxmlformats.org/officeDocument/2006/customXml" ds:itemID="{4F26828B-8021-40B0-BE6F-5F8BAA7A8160}">
-  <ds:schemaRefs>
-    <ds:schemaRef ds:uri="http://schemas.microsoft.com/office/2006/metadata/properties"/>
-    <ds:schemaRef ds:uri="http://schemas.microsoft.com/office/infopath/2007/PartnerControls"/>
-    <ds:schemaRef ds:uri="846e726d-930d-4acb-bd80-f2077a598691"/>
-  </ds:schemaRefs>
-</ds:datastoreItem>
-</file>
-
-<file path=customXml/itemProps2.xml><?xml version="1.0" encoding="utf-8"?>
 <ds:datastoreItem xmlns:ds="http://schemas.openxmlformats.org/officeDocument/2006/customXml" ds:itemID="{70E2D35C-61C5-4F1E-A268-B370BE907187}">
   <ds:schemaRefs>
     <ds:schemaRef ds:uri="http://schemas.microsoft.com/office/2006/metadata/contentType"/>
@@ -15143,6 +15756,16 @@
 </ds:datastoreItem>
 </file>
 
+<file path=customXml/itemProps2.xml><?xml version="1.0" encoding="utf-8"?>
+<ds:datastoreItem xmlns:ds="http://schemas.openxmlformats.org/officeDocument/2006/customXml" ds:itemID="{4F26828B-8021-40B0-BE6F-5F8BAA7A8160}">
+  <ds:schemaRefs>
+    <ds:schemaRef ds:uri="http://schemas.microsoft.com/office/2006/metadata/properties"/>
+    <ds:schemaRef ds:uri="http://schemas.microsoft.com/office/infopath/2007/PartnerControls"/>
+    <ds:schemaRef ds:uri="846e726d-930d-4acb-bd80-f2077a598691"/>
+  </ds:schemaRefs>
+</ds:datastoreItem>
+</file>
+
 <file path=customXml/itemProps3.xml><?xml version="1.0" encoding="utf-8"?>
 <ds:datastoreItem xmlns:ds="http://schemas.openxmlformats.org/officeDocument/2006/customXml" ds:itemID="{07F4FCAA-B58A-4119-AACD-7D2BC6BC457B}">
   <ds:schemaRefs>

</xml_diff>